<commit_message>
update 4-3 扁平, 简约
</commit_message>
<xml_diff>
--- a/v1简约16-9.pptx
+++ b/v1简约16-9.pptx
@@ -256,7 +256,7 @@
           <a:p>
             <a:fld id="{A6C360EC-E31F-4C35-9FAC-B83F416BD9DD}" type="datetimeFigureOut">
               <a:rPr lang="zh-CN" altLang="en-US" smtClean="0"/>
-              <a:t>2023/12/10/Sun</a:t>
+              <a:t>2023/12/11/Mon</a:t>
             </a:fld>
             <a:endParaRPr lang="zh-CN" altLang="en-US"/>
           </a:p>
@@ -449,7 +449,7 @@
           <a:p>
             <a:fld id="{F2BC1462-BF55-4EB8-8F71-D4E8A0B4B51D}" type="datetimeFigureOut">
               <a:rPr lang="zh-CN" altLang="en-US" smtClean="0"/>
-              <a:t>2023/12/10/Sun</a:t>
+              <a:t>2023/12/11/Mon</a:t>
             </a:fld>
             <a:endParaRPr lang="zh-CN" altLang="en-US"/>
           </a:p>
@@ -4959,7 +4959,12 @@
             <p:ph type="body" sz="quarter" idx="11"/>
           </p:nvPr>
         </p:nvSpPr>
-        <p:spPr/>
+        <p:spPr>
+          <a:xfrm>
+            <a:off x="937549" y="2976563"/>
+            <a:ext cx="5158450" cy="461962"/>
+          </a:xfrm>
+        </p:spPr>
         <p:txBody>
           <a:bodyPr/>
           <a:lstStyle/>

</xml_diff>